<commit_message>
Changes sankey 4, updated report & ppt
</commit_message>
<xml_diff>
--- a/reports/Tiwari_Kamath_Final.pptx
+++ b/reports/Tiwari_Kamath_Final.pptx
@@ -19857,6 +19857,42 @@
           <a:chExt cx="0" cy="0"/>
         </a:xfrm>
       </p:grpSpPr>
+      <p:pic>
+        <p:nvPicPr>
+          <p:cNvPr id="8" name="Picture 7" descr="A diagram of different colors&#10;&#10;AI-generated content may be incorrect.">
+            <a:extLst>
+              <a:ext uri="{FF2B5EF4-FFF2-40B4-BE49-F238E27FC236}">
+                <a16:creationId xmlns:a16="http://schemas.microsoft.com/office/drawing/2014/main" id="{606B3E59-B598-17B1-95B3-B898BEA14C60}"/>
+              </a:ext>
+            </a:extLst>
+          </p:cNvPr>
+          <p:cNvPicPr>
+            <a:picLocks noChangeAspect="1"/>
+          </p:cNvPicPr>
+          <p:nvPr/>
+        </p:nvPicPr>
+        <p:blipFill>
+          <a:blip r:embed="rId2">
+            <a:extLst>
+              <a:ext uri="{28A0092B-C50C-407E-A947-70E740481C1C}">
+                <a14:useLocalDpi xmlns:a14="http://schemas.microsoft.com/office/drawing/2010/main" val="0"/>
+              </a:ext>
+            </a:extLst>
+          </a:blip>
+          <a:stretch>
+            <a:fillRect/>
+          </a:stretch>
+        </p:blipFill>
+        <p:spPr>
+          <a:xfrm>
+            <a:off x="-1" y="1289010"/>
+            <a:ext cx="9900427" cy="5568990"/>
+          </a:xfrm>
+          <a:prstGeom prst="rect">
+            <a:avLst/>
+          </a:prstGeom>
+        </p:spPr>
+      </p:pic>
       <p:sp>
         <p:nvSpPr>
           <p:cNvPr id="2" name="Title 1">
@@ -19891,42 +19927,6 @@
           </a:p>
         </p:txBody>
       </p:sp>
-      <p:pic>
-        <p:nvPicPr>
-          <p:cNvPr id="6" name="Content Placeholder 4" descr="A comparison of different types of pregnancy test results&#10;&#10;AI-generated content may be incorrect.">
-            <a:extLst>
-              <a:ext uri="{FF2B5EF4-FFF2-40B4-BE49-F238E27FC236}">
-                <a16:creationId xmlns:a16="http://schemas.microsoft.com/office/drawing/2014/main" id="{1C43F736-9153-58CA-150C-9AC7BABAD6E8}"/>
-              </a:ext>
-            </a:extLst>
-          </p:cNvPr>
-          <p:cNvPicPr>
-            <a:picLocks noChangeAspect="1"/>
-          </p:cNvPicPr>
-          <p:nvPr/>
-        </p:nvPicPr>
-        <p:blipFill>
-          <a:blip r:embed="rId2">
-            <a:extLst>
-              <a:ext uri="{28A0092B-C50C-407E-A947-70E740481C1C}">
-                <a14:useLocalDpi xmlns:a14="http://schemas.microsoft.com/office/drawing/2010/main" val="0"/>
-              </a:ext>
-            </a:extLst>
-          </a:blip>
-          <a:stretch>
-            <a:fillRect/>
-          </a:stretch>
-        </p:blipFill>
-        <p:spPr>
-          <a:xfrm>
-            <a:off x="-1" y="1289010"/>
-            <a:ext cx="9900431" cy="5568990"/>
-          </a:xfrm>
-          <a:prstGeom prst="rect">
-            <a:avLst/>
-          </a:prstGeom>
-        </p:spPr>
-      </p:pic>
       <p:sp>
         <p:nvSpPr>
           <p:cNvPr id="3" name="Content Placeholder 2">
@@ -20063,7 +20063,11 @@
                                           </p:stCondLst>
                                         </p:cTn>
                                         <p:tgtEl>
-                                          <p:spTgt spid="6"/>
+                                          <p:spTgt spid="3">
+                                            <p:txEl>
+                                              <p:pRg st="0" end="0"/>
+                                            </p:txEl>
+                                          </p:spTgt>
                                         </p:tgtEl>
                                         <p:attrNameLst>
                                           <p:attrName>style.visibility</p:attrName>
@@ -20077,7 +20081,11 @@
                                       <p:cBhvr>
                                         <p:cTn id="12" dur="500"/>
                                         <p:tgtEl>
-                                          <p:spTgt spid="6"/>
+                                          <p:spTgt spid="3">
+                                            <p:txEl>
+                                              <p:pRg st="0" end="0"/>
+                                            </p:txEl>
+                                          </p:spTgt>
                                         </p:tgtEl>
                                       </p:cBhvr>
                                     </p:animEffect>
@@ -20118,7 +20126,7 @@
                                         <p:tgtEl>
                                           <p:spTgt spid="3">
                                             <p:txEl>
-                                              <p:pRg st="0" end="0"/>
+                                              <p:pRg st="1" end="1"/>
                                             </p:txEl>
                                           </p:spTgt>
                                         </p:tgtEl>
@@ -20133,67 +20141,6 @@
                                     <p:animEffect transition="in" filter="fade">
                                       <p:cBhvr>
                                         <p:cTn id="17" dur="500"/>
-                                        <p:tgtEl>
-                                          <p:spTgt spid="3">
-                                            <p:txEl>
-                                              <p:pRg st="0" end="0"/>
-                                            </p:txEl>
-                                          </p:spTgt>
-                                        </p:tgtEl>
-                                      </p:cBhvr>
-                                    </p:animEffect>
-                                  </p:childTnLst>
-                                </p:cTn>
-                              </p:par>
-                            </p:childTnLst>
-                          </p:cTn>
-                        </p:par>
-                      </p:childTnLst>
-                    </p:cTn>
-                  </p:par>
-                  <p:par>
-                    <p:cTn id="18" fill="hold">
-                      <p:stCondLst>
-                        <p:cond delay="indefinite"/>
-                      </p:stCondLst>
-                      <p:childTnLst>
-                        <p:par>
-                          <p:cTn id="19" fill="hold">
-                            <p:stCondLst>
-                              <p:cond delay="0"/>
-                            </p:stCondLst>
-                            <p:childTnLst>
-                              <p:par>
-                                <p:cTn id="20" presetID="10" presetClass="entr" presetSubtype="0" fill="hold" nodeType="clickEffect">
-                                  <p:stCondLst>
-                                    <p:cond delay="0"/>
-                                  </p:stCondLst>
-                                  <p:childTnLst>
-                                    <p:set>
-                                      <p:cBhvr>
-                                        <p:cTn id="21" dur="1" fill="hold">
-                                          <p:stCondLst>
-                                            <p:cond delay="0"/>
-                                          </p:stCondLst>
-                                        </p:cTn>
-                                        <p:tgtEl>
-                                          <p:spTgt spid="3">
-                                            <p:txEl>
-                                              <p:pRg st="1" end="1"/>
-                                            </p:txEl>
-                                          </p:spTgt>
-                                        </p:tgtEl>
-                                        <p:attrNameLst>
-                                          <p:attrName>style.visibility</p:attrName>
-                                        </p:attrNameLst>
-                                      </p:cBhvr>
-                                      <p:to>
-                                        <p:strVal val="visible"/>
-                                      </p:to>
-                                    </p:set>
-                                    <p:animEffect transition="in" filter="fade">
-                                      <p:cBhvr>
-                                        <p:cTn id="22" dur="500"/>
                                         <p:tgtEl>
                                           <p:spTgt spid="3">
                                             <p:txEl>

</xml_diff>